<commit_message>
Adding the recordings of the last meeting
</commit_message>
<xml_diff>
--- a/Tooling-Landscape/Meeting-Material/Meeting-20200729/Presented-slides-2020-07-29.pptx
+++ b/Tooling-Landscape/Meeting-Material/Meeting-20200729/Presented-slides-2020-07-29.pptx
@@ -21,7 +21,7 @@
   <p:sldSz cx="12198350" cy="6858000"/>
   <p:notesSz cx="7102475" cy="10234613"/>
   <p:custDataLst>
-    <p:custData r:id="rId9"/>
+    <p:custData r:id="rId14"/>
     <p:tags r:id="rId28"/>
   </p:custDataLst>
   <p:defaultTextStyle>
@@ -554,7 +554,7 @@
                 <a:latin typeface="Arial" pitchFamily="34" charset="0"/>
               </a:rPr>
               <a:pPr/>
-              <a:t>‹Nr.›</a:t>
+              <a:t>‹#›</a:t>
             </a:fld>
             <a:endParaRPr lang="de-DE" dirty="0">
               <a:latin typeface="Arial" pitchFamily="34" charset="0"/>
@@ -987,7 +987,7 @@
                 <a:latin typeface="Arial" pitchFamily="34" charset="0"/>
               </a:rPr>
               <a:pPr/>
-              <a:t>‹Nr.›</a:t>
+              <a:t>‹#›</a:t>
             </a:fld>
             <a:endParaRPr lang="en-US" dirty="0">
               <a:latin typeface="Arial" pitchFamily="34" charset="0"/>
@@ -7134,7 +7134,7 @@
               <a:buChar char="•"/>
             </a:pPr>
             <a:r>
-              <a:rPr lang="en-US" dirty="0">
+              <a:rPr lang="en-US">
                 <a:solidFill>
                   <a:schemeClr val="tx1"/>
                 </a:solidFill>
@@ -7142,7 +7142,7 @@
               <a:t>12</a:t>
             </a:r>
             <a:r>
-              <a:rPr lang="en-US" baseline="30000" dirty="0">
+              <a:rPr lang="en-US" baseline="30000">
                 <a:solidFill>
                   <a:schemeClr val="tx1"/>
                 </a:solidFill>
@@ -7150,20 +7150,12 @@
               <a:t>th</a:t>
             </a:r>
             <a:r>
-              <a:rPr lang="en-US" dirty="0">
+              <a:rPr lang="en-US">
                 <a:solidFill>
                   <a:schemeClr val="tx1"/>
                 </a:solidFill>
               </a:rPr>
-              <a:t> or 26</a:t>
-            </a:r>
-            <a:r>
-              <a:rPr lang="en-US" baseline="30000" dirty="0">
-                <a:solidFill>
-                  <a:schemeClr val="tx1"/>
-                </a:solidFill>
-              </a:rPr>
-              <a:t>th</a:t>
+              <a:t> of </a:t>
             </a:r>
             <a:r>
               <a:rPr lang="en-US" dirty="0">
@@ -7171,7 +7163,7 @@
                   <a:schemeClr val="tx1"/>
                 </a:solidFill>
               </a:rPr>
-              <a:t> of August</a:t>
+              <a:t>August</a:t>
             </a:r>
             <a:endParaRPr lang="en-US" dirty="0"/>
           </a:p>
@@ -9648,13 +9640,50 @@
 
 <file path=customXml/item1.xml><?xml version="1.0" encoding="utf-8"?>
 <p4ppTags>
-  <Name>One object (large) + Navigation</Name>
+  <Name>Two rows</Name>
   <PpLayout>32</PpLayout>
-  <Index>17</Index>
+  <Index>13</Index>
 </p4ppTags>
 </file>
 
 <file path=customXml/item10.xml><?xml version="1.0" encoding="utf-8"?>
+<p4ppTags>
+  <Name>Text + Index</Name>
+  <PpLayout>32</PpLayout>
+  <Index>8</Index>
+</p4ppTags>
+</file>
+
+<file path=customXml/item11.xml><?xml version="1.0" encoding="utf-8"?>
+<p4ppTags>
+  <Name>Three columns</Name>
+  <PpLayout>32</PpLayout>
+  <Index>14</Index>
+</p4ppTags>
+</file>
+
+<file path=customXml/item12.xml><?xml version="1.0" encoding="utf-8"?>
+<p4ppTags>
+  <Name>Two columns + Navigation</Name>
+  <PpLayout>32</PpLayout>
+  <Index>19</Index>
+</p4ppTags>
+</file>
+
+<file path=customXml/item13.xml><?xml version="1.0" encoding="utf-8"?>
+<p:properties xmlns:p="http://schemas.microsoft.com/office/2006/metadata/properties" xmlns:xsi="http://www.w3.org/2001/XMLSchema-instance">
+  <documentManagement>
+    <PublishingExpirationDate xmlns="http://schemas.microsoft.com/sharepoint/v3" xsi:nil="true"/>
+    <PublishingStartDate xmlns="http://schemas.microsoft.com/sharepoint/v3" xsi:nil="true"/>
+  </documentManagement>
+</p:properties>
+</file>
+
+<file path=customXml/item14.xml><?xml version="1.0" encoding="utf-8"?>
+<p4ppTags/>
+</file>
+
+<file path=customXml/item15.xml><?xml version="1.0" encoding="utf-8"?>
 <p4ppTags>
   <Name>Two rows + Navigation</Name>
   <PpLayout>32</PpLayout>
@@ -9662,7 +9691,7 @@
 </p4ppTags>
 </file>
 
-<file path=customXml/item11.xml><?xml version="1.0" encoding="utf-8"?>
+<file path=customXml/item16.xml><?xml version="1.0" encoding="utf-8"?>
 <p4ppTags>
   <Name>Free Content + Navigation</Name>
   <PpLayout>32</PpLayout>
@@ -9670,7 +9699,7 @@
 </p4ppTags>
 </file>
 
-<file path=customXml/item12.xml><?xml version="1.0" encoding="utf-8"?>
+<file path=customXml/item17.xml><?xml version="1.0" encoding="utf-8"?>
 <p4ppTags>
   <Name>Four objects</Name>
   <PpLayout>24</PpLayout>
@@ -9678,7 +9707,7 @@
 </p4ppTags>
 </file>
 
-<file path=customXml/item13.xml><?xml version="1.0" encoding="utf-8"?>
+<file path=customXml/item18.xml><?xml version="1.0" encoding="utf-8"?>
 <p4ppTags>
   <Name>Two columns</Name>
   <PpLayout>29</PpLayout>
@@ -9686,15 +9715,7 @@
 </p4ppTags>
 </file>
 
-<file path=customXml/item14.xml><?xml version="1.0" encoding="utf-8"?>
-<p4ppTags>
-  <Name>Two rows</Name>
-  <PpLayout>32</PpLayout>
-  <Index>13</Index>
-</p4ppTags>
-</file>
-
-<file path=customXml/item15.xml><?xml version="1.0" encoding="utf-8"?>
+<file path=customXml/item2.xml><?xml version="1.0" encoding="utf-8"?>
 <?mso-contentType ?>
 <FormTemplates xmlns="http://schemas.microsoft.com/sharepoint/v3/contenttype/forms">
   <Display>DocumentLibraryForm</Display>
@@ -9703,7 +9724,7 @@
 </FormTemplates>
 </file>
 
-<file path=customXml/item16.xml><?xml version="1.0" encoding="utf-8"?>
+<file path=customXml/item3.xml><?xml version="1.0" encoding="utf-8"?>
 <p4ppTags>
   <Name>Free Content</Name>
   <PpLayout>11</PpLayout>
@@ -9711,7 +9732,7 @@
 </p4ppTags>
 </file>
 
-<file path=customXml/item17.xml><?xml version="1.0" encoding="utf-8"?>
+<file path=customXml/item4.xml><?xml version="1.0" encoding="utf-8"?>
 <p4ppTags>
   <Name>One object (large)</Name>
   <PpLayout>16</PpLayout>
@@ -9719,7 +9740,7 @@
 </p4ppTags>
 </file>
 
-<file path=customXml/item18.xml><?xml version="1.0" encoding="utf-8"?>
+<file path=customXml/item5.xml><?xml version="1.0" encoding="utf-8"?>
 <p4ppTags>
   <Name>One object (small)</Name>
   <PpLayout>16</PpLayout>
@@ -9727,7 +9748,15 @@
 </p4ppTags>
 </file>
 
-<file path=customXml/item2.xml><?xml version="1.0" encoding="utf-8"?>
+<file path=customXml/item6.xml><?xml version="1.0" encoding="utf-8"?>
+<p4ppTags>
+  <Name>One object (large) + Navigation</Name>
+  <PpLayout>32</PpLayout>
+  <Index>17</Index>
+</p4ppTags>
+</file>
+
+<file path=customXml/item7.xml><?xml version="1.0" encoding="utf-8"?>
 <p4ppTags>
   <Name>Three columns + Navigation</Name>
   <PpLayout>32</PpLayout>
@@ -9735,7 +9764,7 @@
 </p4ppTags>
 </file>
 
-<file path=customXml/item3.xml><?xml version="1.0" encoding="utf-8"?>
+<file path=customXml/item8.xml><?xml version="1.0" encoding="utf-8"?>
 <p4ppTags>
   <Name>One object (small) + Navigation</Name>
   <PpLayout>32</PpLayout>
@@ -9743,7 +9772,7 @@
 </p4ppTags>
 </file>
 
-<file path=customXml/item4.xml><?xml version="1.0" encoding="utf-8"?>
+<file path=customXml/item9.xml><?xml version="1.0" encoding="utf-8"?>
 <ct:contentTypeSchema xmlns:ct="http://schemas.microsoft.com/office/2006/metadata/contentType" xmlns:ma="http://schemas.microsoft.com/office/2006/metadata/properties/metaAttributes" ct:_="" ma:_="" ma:contentTypeName="Document" ma:contentTypeID="0x01010026F530587E03684C96E4C14F39C83C8E" ma:contentTypeVersion="1" ma:contentTypeDescription="Create a new document." ma:contentTypeScope="" ma:versionID="a7726241122b1ad33829eba8e69a544b">
   <xsd:schema xmlns:xsd="http://www.w3.org/2001/XMLSchema" xmlns:p="http://schemas.microsoft.com/office/2006/metadata/properties" xmlns:ns1="http://schemas.microsoft.com/sharepoint/v3" targetNamespace="http://schemas.microsoft.com/office/2006/metadata/properties" ma:root="true" ma:fieldsID="ddb0c952b897a810c8a4e377cff6bff8" ns1:_="">
     <xsd:import namespace="http://schemas.microsoft.com/sharepoint/v3"/>
@@ -9809,80 +9838,76 @@
 </ct:contentTypeSchema>
 </file>
 
-<file path=customXml/item5.xml><?xml version="1.0" encoding="utf-8"?>
-<p4ppTags>
-  <Name>Text + Index</Name>
-  <PpLayout>32</PpLayout>
-  <Index>8</Index>
-</p4ppTags>
-</file>
-
-<file path=customXml/item6.xml><?xml version="1.0" encoding="utf-8"?>
-<p4ppTags>
-  <Name>Three columns</Name>
-  <PpLayout>32</PpLayout>
-  <Index>14</Index>
-</p4ppTags>
-</file>
-
-<file path=customXml/item7.xml><?xml version="1.0" encoding="utf-8"?>
-<p4ppTags>
-  <Name>Two columns + Navigation</Name>
-  <PpLayout>32</PpLayout>
-  <Index>19</Index>
-</p4ppTags>
-</file>
-
-<file path=customXml/item8.xml><?xml version="1.0" encoding="utf-8"?>
-<p:properties xmlns:p="http://schemas.microsoft.com/office/2006/metadata/properties" xmlns:xsi="http://www.w3.org/2001/XMLSchema-instance">
-  <documentManagement>
-    <PublishingExpirationDate xmlns="http://schemas.microsoft.com/sharepoint/v3" xsi:nil="true"/>
-    <PublishingStartDate xmlns="http://schemas.microsoft.com/sharepoint/v3" xsi:nil="true"/>
-  </documentManagement>
-</p:properties>
-</file>
-
-<file path=customXml/item9.xml><?xml version="1.0" encoding="utf-8"?>
-<p4ppTags/>
-</file>
-
 <file path=customXml/itemProps1.xml><?xml version="1.0" encoding="utf-8"?>
-<ds:datastoreItem xmlns:ds="http://schemas.openxmlformats.org/officeDocument/2006/customXml" ds:itemID="{B27F640E-84DF-4F97-BC70-D045F1E6594F}">
+<ds:datastoreItem xmlns:ds="http://schemas.openxmlformats.org/officeDocument/2006/customXml" ds:itemID="{38AB8DE4-FD9B-4166-BEC3-3F1753596133}">
   <ds:schemaRefs/>
 </ds:datastoreItem>
 </file>
 
 <file path=customXml/itemProps10.xml><?xml version="1.0" encoding="utf-8"?>
+<ds:datastoreItem xmlns:ds="http://schemas.openxmlformats.org/officeDocument/2006/customXml" ds:itemID="{7E35FEDB-1F0E-4D67-A313-4AC59C26FF29}">
+  <ds:schemaRefs/>
+</ds:datastoreItem>
+</file>
+
+<file path=customXml/itemProps11.xml><?xml version="1.0" encoding="utf-8"?>
+<ds:datastoreItem xmlns:ds="http://schemas.openxmlformats.org/officeDocument/2006/customXml" ds:itemID="{15CF3461-70D1-4B54-AFAB-DAFDA0A238CD}">
+  <ds:schemaRefs/>
+</ds:datastoreItem>
+</file>
+
+<file path=customXml/itemProps12.xml><?xml version="1.0" encoding="utf-8"?>
+<ds:datastoreItem xmlns:ds="http://schemas.openxmlformats.org/officeDocument/2006/customXml" ds:itemID="{D7BABA95-BFFE-422B-8591-3271669EEA88}">
+  <ds:schemaRefs/>
+</ds:datastoreItem>
+</file>
+
+<file path=customXml/itemProps13.xml><?xml version="1.0" encoding="utf-8"?>
+<ds:datastoreItem xmlns:ds="http://schemas.openxmlformats.org/officeDocument/2006/customXml" ds:itemID="{C3CCD83D-9C91-4A4B-87D6-2A0CC03F9D68}">
+  <ds:schemaRefs>
+    <ds:schemaRef ds:uri="http://purl.org/dc/terms/"/>
+    <ds:schemaRef ds:uri="http://schemas.openxmlformats.org/package/2006/metadata/core-properties"/>
+    <ds:schemaRef ds:uri="http://purl.org/dc/dcmitype/"/>
+    <ds:schemaRef ds:uri="http://schemas.microsoft.com/office/2006/documentManagement/types"/>
+    <ds:schemaRef ds:uri="http://purl.org/dc/elements/1.1/"/>
+    <ds:schemaRef ds:uri="http://schemas.microsoft.com/office/2006/metadata/properties"/>
+    <ds:schemaRef ds:uri="http://schemas.microsoft.com/sharepoint/v3"/>
+    <ds:schemaRef ds:uri="http://www.w3.org/XML/1998/namespace"/>
+  </ds:schemaRefs>
+</ds:datastoreItem>
+</file>
+
+<file path=customXml/itemProps14.xml><?xml version="1.0" encoding="utf-8"?>
+<ds:datastoreItem xmlns:ds="http://schemas.openxmlformats.org/officeDocument/2006/customXml" ds:itemID="{572FBA73-6DBF-45DA-8282-9342320CFAB0}">
+  <ds:schemaRefs/>
+</ds:datastoreItem>
+</file>
+
+<file path=customXml/itemProps15.xml><?xml version="1.0" encoding="utf-8"?>
 <ds:datastoreItem xmlns:ds="http://schemas.openxmlformats.org/officeDocument/2006/customXml" ds:itemID="{6C79E4F8-DCFB-483C-880A-AEEC6AAFC838}">
   <ds:schemaRefs/>
 </ds:datastoreItem>
 </file>
 
-<file path=customXml/itemProps11.xml><?xml version="1.0" encoding="utf-8"?>
+<file path=customXml/itemProps16.xml><?xml version="1.0" encoding="utf-8"?>
 <ds:datastoreItem xmlns:ds="http://schemas.openxmlformats.org/officeDocument/2006/customXml" ds:itemID="{7CC5F709-E74B-4E5F-A728-923D5062EBEF}">
   <ds:schemaRefs/>
 </ds:datastoreItem>
 </file>
 
-<file path=customXml/itemProps12.xml><?xml version="1.0" encoding="utf-8"?>
+<file path=customXml/itemProps17.xml><?xml version="1.0" encoding="utf-8"?>
 <ds:datastoreItem xmlns:ds="http://schemas.openxmlformats.org/officeDocument/2006/customXml" ds:itemID="{1581BFFB-B4CE-47A8-BE77-DC1339B1E5A7}">
   <ds:schemaRefs/>
 </ds:datastoreItem>
 </file>
 
-<file path=customXml/itemProps13.xml><?xml version="1.0" encoding="utf-8"?>
+<file path=customXml/itemProps18.xml><?xml version="1.0" encoding="utf-8"?>
 <ds:datastoreItem xmlns:ds="http://schemas.openxmlformats.org/officeDocument/2006/customXml" ds:itemID="{1666F4C2-68F5-4840-A44A-1A646C0925A1}">
   <ds:schemaRefs/>
 </ds:datastoreItem>
 </file>
 
-<file path=customXml/itemProps14.xml><?xml version="1.0" encoding="utf-8"?>
-<ds:datastoreItem xmlns:ds="http://schemas.openxmlformats.org/officeDocument/2006/customXml" ds:itemID="{38AB8DE4-FD9B-4166-BEC3-3F1753596133}">
-  <ds:schemaRefs/>
-</ds:datastoreItem>
-</file>
-
-<file path=customXml/itemProps15.xml><?xml version="1.0" encoding="utf-8"?>
+<file path=customXml/itemProps2.xml><?xml version="1.0" encoding="utf-8"?>
 <ds:datastoreItem xmlns:ds="http://schemas.openxmlformats.org/officeDocument/2006/customXml" ds:itemID="{C770A9D8-EB8A-4EA7-9CCD-8AD3EAF96C52}">
   <ds:schemaRefs>
     <ds:schemaRef ds:uri="http://schemas.microsoft.com/sharepoint/v3/contenttype/forms"/>
@@ -9890,37 +9915,43 @@
 </ds:datastoreItem>
 </file>
 
-<file path=customXml/itemProps16.xml><?xml version="1.0" encoding="utf-8"?>
+<file path=customXml/itemProps3.xml><?xml version="1.0" encoding="utf-8"?>
 <ds:datastoreItem xmlns:ds="http://schemas.openxmlformats.org/officeDocument/2006/customXml" ds:itemID="{D8097D0C-BE3E-4AEC-9593-65CFCCB19297}">
   <ds:schemaRefs/>
 </ds:datastoreItem>
 </file>
 
-<file path=customXml/itemProps17.xml><?xml version="1.0" encoding="utf-8"?>
+<file path=customXml/itemProps4.xml><?xml version="1.0" encoding="utf-8"?>
 <ds:datastoreItem xmlns:ds="http://schemas.openxmlformats.org/officeDocument/2006/customXml" ds:itemID="{80661B8B-A327-44F9-823B-4D9EE0B3EC78}">
   <ds:schemaRefs/>
 </ds:datastoreItem>
 </file>
 
-<file path=customXml/itemProps18.xml><?xml version="1.0" encoding="utf-8"?>
+<file path=customXml/itemProps5.xml><?xml version="1.0" encoding="utf-8"?>
 <ds:datastoreItem xmlns:ds="http://schemas.openxmlformats.org/officeDocument/2006/customXml" ds:itemID="{1618AA06-B22E-4D19-9680-0D7830426729}">
   <ds:schemaRefs/>
 </ds:datastoreItem>
 </file>
 
-<file path=customXml/itemProps2.xml><?xml version="1.0" encoding="utf-8"?>
+<file path=customXml/itemProps6.xml><?xml version="1.0" encoding="utf-8"?>
+<ds:datastoreItem xmlns:ds="http://schemas.openxmlformats.org/officeDocument/2006/customXml" ds:itemID="{B27F640E-84DF-4F97-BC70-D045F1E6594F}">
+  <ds:schemaRefs/>
+</ds:datastoreItem>
+</file>
+
+<file path=customXml/itemProps7.xml><?xml version="1.0" encoding="utf-8"?>
 <ds:datastoreItem xmlns:ds="http://schemas.openxmlformats.org/officeDocument/2006/customXml" ds:itemID="{85D77EE6-52B7-48BE-9EDB-748F1EBB53DE}">
   <ds:schemaRefs/>
 </ds:datastoreItem>
 </file>
 
-<file path=customXml/itemProps3.xml><?xml version="1.0" encoding="utf-8"?>
+<file path=customXml/itemProps8.xml><?xml version="1.0" encoding="utf-8"?>
 <ds:datastoreItem xmlns:ds="http://schemas.openxmlformats.org/officeDocument/2006/customXml" ds:itemID="{D9FE249F-833E-4CF0-BECB-552D01D7DC9E}">
   <ds:schemaRefs/>
 </ds:datastoreItem>
 </file>
 
-<file path=customXml/itemProps4.xml><?xml version="1.0" encoding="utf-8"?>
+<file path=customXml/itemProps9.xml><?xml version="1.0" encoding="utf-8"?>
 <ds:datastoreItem xmlns:ds="http://schemas.openxmlformats.org/officeDocument/2006/customXml" ds:itemID="{DDD5559B-0584-4B05-A285-1FEC88814B30}">
   <ds:schemaRefs>
     <ds:schemaRef ds:uri="http://schemas.microsoft.com/office/2006/metadata/contentType"/>
@@ -9935,43 +9966,4 @@
     <ds:schemaRef ds:uri="http://schemas.microsoft.com/office/internal/2005/internalDocumentation"/>
   </ds:schemaRefs>
 </ds:datastoreItem>
-</file>
-
-<file path=customXml/itemProps5.xml><?xml version="1.0" encoding="utf-8"?>
-<ds:datastoreItem xmlns:ds="http://schemas.openxmlformats.org/officeDocument/2006/customXml" ds:itemID="{7E35FEDB-1F0E-4D67-A313-4AC59C26FF29}">
-  <ds:schemaRefs/>
-</ds:datastoreItem>
-</file>
-
-<file path=customXml/itemProps6.xml><?xml version="1.0" encoding="utf-8"?>
-<ds:datastoreItem xmlns:ds="http://schemas.openxmlformats.org/officeDocument/2006/customXml" ds:itemID="{15CF3461-70D1-4B54-AFAB-DAFDA0A238CD}">
-  <ds:schemaRefs/>
-</ds:datastoreItem>
-</file>
-
-<file path=customXml/itemProps7.xml><?xml version="1.0" encoding="utf-8"?>
-<ds:datastoreItem xmlns:ds="http://schemas.openxmlformats.org/officeDocument/2006/customXml" ds:itemID="{D7BABA95-BFFE-422B-8591-3271669EEA88}">
-  <ds:schemaRefs/>
-</ds:datastoreItem>
-</file>
-
-<file path=customXml/itemProps8.xml><?xml version="1.0" encoding="utf-8"?>
-<ds:datastoreItem xmlns:ds="http://schemas.openxmlformats.org/officeDocument/2006/customXml" ds:itemID="{C3CCD83D-9C91-4A4B-87D6-2A0CC03F9D68}">
-  <ds:schemaRefs>
-    <ds:schemaRef ds:uri="http://purl.org/dc/terms/"/>
-    <ds:schemaRef ds:uri="http://schemas.openxmlformats.org/package/2006/metadata/core-properties"/>
-    <ds:schemaRef ds:uri="http://purl.org/dc/dcmitype/"/>
-    <ds:schemaRef ds:uri="http://schemas.microsoft.com/office/2006/documentManagement/types"/>
-    <ds:schemaRef ds:uri="http://purl.org/dc/elements/1.1/"/>
-    <ds:schemaRef ds:uri="http://schemas.microsoft.com/office/2006/metadata/properties"/>
-    <ds:schemaRef ds:uri="http://schemas.microsoft.com/sharepoint/v3"/>
-    <ds:schemaRef ds:uri="http://www.w3.org/XML/1998/namespace"/>
-  </ds:schemaRefs>
-</ds:datastoreItem>
-</file>
-
-<file path=customXml/itemProps9.xml><?xml version="1.0" encoding="utf-8"?>
-<ds:datastoreItem xmlns:ds="http://schemas.openxmlformats.org/officeDocument/2006/customXml" ds:itemID="{572FBA73-6DBF-45DA-8282-9342320CFAB0}">
-  <ds:schemaRefs/>
-</ds:datastoreItem>
 </file>
</xml_diff>